<commit_message>
added "Neurosky" slide to pp
</commit_message>
<xml_diff>
--- a/Portfolio/p01.pptx
+++ b/Portfolio/p01.pptx
@@ -9,6 +9,7 @@
     <p:sldId id="257" r:id="rId3"/>
     <p:sldId id="258" r:id="rId4"/>
     <p:sldId id="259" r:id="rId5"/>
+    <p:sldId id="260" r:id="rId6"/>
   </p:sldIdLst>
   <p:sldSz cx="12192000" cy="6858000"/>
   <p:notesSz cx="6858000" cy="9144000"/>
@@ -6104,7 +6105,12 @@
             <p:ph type="ctrTitle"/>
           </p:nvPr>
         </p:nvSpPr>
-        <p:spPr/>
+        <p:spPr>
+          <a:xfrm>
+            <a:off x="1154955" y="299223"/>
+            <a:ext cx="9327191" cy="3329581"/>
+          </a:xfrm>
+        </p:spPr>
         <p:txBody>
           <a:bodyPr/>
           <a:lstStyle/>
@@ -6221,12 +6227,17 @@
           <a:p>
             <a:r>
               <a:rPr lang="en-US" dirty="0" smtClean="0"/>
-              <a:t>Sprints van 1 </a:t>
+              <a:t>Sprints van </a:t>
             </a:r>
             <a:r>
               <a:rPr lang="en-US" dirty="0" smtClean="0"/>
-              <a:t>week</a:t>
-            </a:r>
+              <a:t>2 </a:t>
+            </a:r>
+            <a:r>
+              <a:rPr lang="en-US" dirty="0" err="1" smtClean="0"/>
+              <a:t>weken</a:t>
+            </a:r>
+            <a:endParaRPr lang="en-US" dirty="0" smtClean="0"/>
           </a:p>
           <a:p>
             <a:r>
@@ -6639,6 +6650,150 @@
     <p:extLst>
       <p:ext uri="{BB962C8B-B14F-4D97-AF65-F5344CB8AC3E}">
         <p14:creationId xmlns:p14="http://schemas.microsoft.com/office/powerpoint/2010/main" val="2615958047"/>
+      </p:ext>
+    </p:extLst>
+  </p:cSld>
+  <p:clrMapOvr>
+    <a:masterClrMapping/>
+  </p:clrMapOvr>
+</p:sld>
+</file>
+
+<file path=ppt/slides/slide5.xml><?xml version="1.0" encoding="utf-8"?>
+<p:sld xmlns:a="http://schemas.openxmlformats.org/drawingml/2006/main" xmlns:r="http://schemas.openxmlformats.org/officeDocument/2006/relationships" xmlns:p="http://schemas.openxmlformats.org/presentationml/2006/main">
+  <p:cSld>
+    <p:spTree>
+      <p:nvGrpSpPr>
+        <p:cNvPr id="1" name=""/>
+        <p:cNvGrpSpPr/>
+        <p:nvPr/>
+      </p:nvGrpSpPr>
+      <p:grpSpPr>
+        <a:xfrm>
+          <a:off x="0" y="0"/>
+          <a:ext cx="0" cy="0"/>
+          <a:chOff x="0" y="0"/>
+          <a:chExt cx="0" cy="0"/>
+        </a:xfrm>
+      </p:grpSpPr>
+      <p:sp>
+        <p:nvSpPr>
+          <p:cNvPr id="2" name="Titel 1"/>
+          <p:cNvSpPr>
+            <a:spLocks noGrp="1"/>
+          </p:cNvSpPr>
+          <p:nvPr>
+            <p:ph type="title"/>
+          </p:nvPr>
+        </p:nvSpPr>
+        <p:spPr/>
+        <p:txBody>
+          <a:bodyPr/>
+          <a:lstStyle/>
+          <a:p>
+            <a:r>
+              <a:rPr lang="en-US" dirty="0" err="1" smtClean="0"/>
+              <a:t>Neurosky</a:t>
+            </a:r>
+            <a:endParaRPr lang="en-US" dirty="0"/>
+          </a:p>
+        </p:txBody>
+      </p:sp>
+      <p:sp>
+        <p:nvSpPr>
+          <p:cNvPr id="3" name="Tijdelijke aanduiding voor inhoud 2"/>
+          <p:cNvSpPr>
+            <a:spLocks noGrp="1"/>
+          </p:cNvSpPr>
+          <p:nvPr>
+            <p:ph idx="1"/>
+          </p:nvPr>
+        </p:nvSpPr>
+        <p:spPr/>
+        <p:txBody>
+          <a:bodyPr/>
+          <a:lstStyle/>
+          <a:p>
+            <a:r>
+              <a:rPr lang="en-US" dirty="0" err="1" smtClean="0"/>
+              <a:t>Documentatie</a:t>
+            </a:r>
+            <a:r>
+              <a:rPr lang="en-US" dirty="0" smtClean="0"/>
+              <a:t> </a:t>
+            </a:r>
+            <a:r>
+              <a:rPr lang="en-US" dirty="0" err="1" smtClean="0"/>
+              <a:t>voorbeelden</a:t>
+            </a:r>
+            <a:r>
+              <a:rPr lang="en-US" dirty="0" smtClean="0"/>
+              <a:t> in C++</a:t>
+            </a:r>
+          </a:p>
+          <a:p>
+            <a:r>
+              <a:rPr lang="en-US" dirty="0" err="1" smtClean="0"/>
+              <a:t>Problemen</a:t>
+            </a:r>
+            <a:r>
+              <a:rPr lang="en-US" dirty="0" smtClean="0"/>
+              <a:t> met libraries </a:t>
+            </a:r>
+            <a:r>
+              <a:rPr lang="en-US" dirty="0" err="1" smtClean="0"/>
+              <a:t>gegeven</a:t>
+            </a:r>
+            <a:r>
+              <a:rPr lang="en-US" dirty="0" smtClean="0"/>
+              <a:t> door </a:t>
+            </a:r>
+            <a:r>
+              <a:rPr lang="en-US" dirty="0" err="1" smtClean="0"/>
+              <a:t>neurosky</a:t>
+            </a:r>
+            <a:endParaRPr lang="en-US" dirty="0" smtClean="0"/>
+          </a:p>
+          <a:p>
+            <a:r>
+              <a:rPr lang="en-US" dirty="0" err="1" smtClean="0"/>
+              <a:t>Werk</a:t>
+            </a:r>
+            <a:r>
+              <a:rPr lang="en-US" dirty="0" smtClean="0"/>
+              <a:t> nu met C# in engine </a:t>
+            </a:r>
+            <a:r>
+              <a:rPr lang="en-US" dirty="0" err="1" smtClean="0"/>
+              <a:t>MonoGame</a:t>
+            </a:r>
+            <a:endParaRPr lang="en-US" dirty="0" smtClean="0"/>
+          </a:p>
+          <a:p>
+            <a:r>
+              <a:rPr lang="en-US" dirty="0" smtClean="0"/>
+              <a:t>.NET wrapper </a:t>
+            </a:r>
+            <a:r>
+              <a:rPr lang="en-US" dirty="0" err="1" smtClean="0"/>
+              <a:t>gemaakt</a:t>
+            </a:r>
+            <a:r>
+              <a:rPr lang="en-US" dirty="0" smtClean="0"/>
+              <a:t> door </a:t>
+            </a:r>
+            <a:r>
+              <a:rPr lang="en-US" dirty="0" err="1" smtClean="0"/>
+              <a:t>Neurosky</a:t>
+            </a:r>
+            <a:endParaRPr lang="en-US" dirty="0"/>
+          </a:p>
+        </p:txBody>
+      </p:sp>
+    </p:spTree>
+    <p:extLst>
+      <p:ext uri="{BB962C8B-B14F-4D97-AF65-F5344CB8AC3E}">
+        <p14:creationId xmlns:p14="http://schemas.microsoft.com/office/powerpoint/2010/main" val="825046000"/>
       </p:ext>
     </p:extLst>
   </p:cSld>

</xml_diff>

<commit_message>
Added Casper to pp and readme
</commit_message>
<xml_diff>
--- a/Portfolio/p01.pptx
+++ b/Portfolio/p01.pptx
@@ -6139,8 +6139,27 @@
           <a:lstStyle/>
           <a:p>
             <a:r>
+              <a:rPr lang="en-US" dirty="0" smtClean="0"/>
+              <a:t>Koen</a:t>
+            </a:r>
+            <a:r>
+              <a:rPr lang="en-US" dirty="0"/>
+              <a:t> </a:t>
+            </a:r>
+            <a:r>
+              <a:rPr lang="en-US" smtClean="0"/>
+              <a:t>Sanderse</a:t>
+            </a:r>
+            <a:endParaRPr lang="en-US" dirty="0" smtClean="0"/>
+          </a:p>
+          <a:p>
+            <a:r>
+              <a:rPr lang="en-US" dirty="0" smtClean="0"/>
+              <a:t>Casper </a:t>
+            </a:r>
+            <a:r>
               <a:rPr lang="en-US" dirty="0" err="1" smtClean="0"/>
-              <a:t>Koen.S</a:t>
+              <a:t>Meloen</a:t>
             </a:r>
             <a:endParaRPr lang="en-US" dirty="0"/>
           </a:p>
@@ -6227,11 +6246,7 @@
           <a:p>
             <a:r>
               <a:rPr lang="en-US" dirty="0" smtClean="0"/>
-              <a:t>Sprints van </a:t>
-            </a:r>
-            <a:r>
-              <a:rPr lang="en-US" dirty="0" smtClean="0"/>
-              <a:t>2 </a:t>
+              <a:t>Sprints van 2 </a:t>
             </a:r>
             <a:r>
               <a:rPr lang="en-US" dirty="0" err="1" smtClean="0"/>

</xml_diff>

<commit_message>
changed name in pp
</commit_message>
<xml_diff>
--- a/Portfolio/p01.pptx
+++ b/Portfolio/p01.pptx
@@ -6108,7 +6108,7 @@
         <p:spPr>
           <a:xfrm>
             <a:off x="1154955" y="299223"/>
-            <a:ext cx="9327191" cy="3329581"/>
+            <a:ext cx="10118928" cy="3329581"/>
           </a:xfrm>
         </p:spPr>
         <p:txBody>
@@ -6117,7 +6117,7 @@
           <a:p>
             <a:r>
               <a:rPr lang="en-US" dirty="0" err="1" smtClean="0"/>
-              <a:t>ConcentreerTraining</a:t>
+              <a:t>ConcentratieTraining</a:t>
             </a:r>
             <a:endParaRPr lang="en-US" dirty="0"/>
           </a:p>

</xml_diff>